<commit_message>
Add the MachineLearning CPI
</commit_message>
<xml_diff>
--- a/Present/Prediction_CPIs_From_MachineLearning_150819.pptx
+++ b/Present/Prediction_CPIs_From_MachineLearning_150819.pptx
@@ -5,10 +5,10 @@
     <p:sldMasterId id="2147483746" r:id="rId1"/>
   </p:sldMasterIdLst>
   <p:notesMasterIdLst>
-    <p:notesMasterId r:id="rId20"/>
+    <p:notesMasterId r:id="rId21"/>
   </p:notesMasterIdLst>
   <p:handoutMasterIdLst>
-    <p:handoutMasterId r:id="rId21"/>
+    <p:handoutMasterId r:id="rId22"/>
   </p:handoutMasterIdLst>
   <p:sldIdLst>
     <p:sldId id="256" r:id="rId2"/>
@@ -29,6 +29,7 @@
     <p:sldId id="272" r:id="rId17"/>
     <p:sldId id="273" r:id="rId18"/>
     <p:sldId id="274" r:id="rId19"/>
+    <p:sldId id="275" r:id="rId20"/>
   </p:sldIdLst>
   <p:sldSz cx="9144000" cy="6858000" type="screen4x3"/>
   <p:notesSz cx="6858000" cy="9144000"/>
@@ -5319,6 +5320,40 @@
           </a:prstGeom>
         </p:spPr>
       </p:pic>
+      <p:sp>
+        <p:nvSpPr>
+          <p:cNvPr id="8" name="文本框 7"/>
+          <p:cNvSpPr txBox="1"/>
+          <p:nvPr/>
+        </p:nvSpPr>
+        <p:spPr>
+          <a:xfrm>
+            <a:off x="2594176" y="5571141"/>
+            <a:ext cx="3627981" cy="276999"/>
+          </a:xfrm>
+          <a:prstGeom prst="rect">
+            <a:avLst/>
+          </a:prstGeom>
+          <a:noFill/>
+        </p:spPr>
+        <p:txBody>
+          <a:bodyPr wrap="none" rtlCol="0">
+            <a:spAutoFit/>
+          </a:bodyPr>
+          <a:lstStyle/>
+          <a:p>
+            <a:r>
+              <a:rPr lang="en-US" altLang="zh-CN" sz="1200" dirty="0" smtClean="0">
+                <a:latin typeface="+mj-lt"/>
+              </a:rPr>
+              <a:t>Xin Ma, Luo Xiao, and Wing Hung Wong. PNAS, 2014</a:t>
+            </a:r>
+            <a:endParaRPr lang="zh-CN" altLang="en-US" sz="1200" dirty="0">
+              <a:latin typeface="+mj-lt"/>
+            </a:endParaRPr>
+          </a:p>
+        </p:txBody>
+      </p:sp>
     </p:spTree>
     <p:extLst>
       <p:ext uri="{BB962C8B-B14F-4D97-AF65-F5344CB8AC3E}">
@@ -6584,6 +6619,82 @@
           </a:prstGeom>
         </p:spPr>
       </p:pic>
+      <p:sp>
+        <p:nvSpPr>
+          <p:cNvPr id="9" name="文本框 8"/>
+          <p:cNvSpPr txBox="1"/>
+          <p:nvPr/>
+        </p:nvSpPr>
+        <p:spPr>
+          <a:xfrm>
+            <a:off x="2517976" y="5984101"/>
+            <a:ext cx="4108048" cy="276999"/>
+          </a:xfrm>
+          <a:prstGeom prst="rect">
+            <a:avLst/>
+          </a:prstGeom>
+          <a:noFill/>
+        </p:spPr>
+        <p:txBody>
+          <a:bodyPr wrap="none" rtlCol="0">
+            <a:spAutoFit/>
+          </a:bodyPr>
+          <a:lstStyle/>
+          <a:p>
+            <a:r>
+              <a:rPr lang="en-US" altLang="zh-CN" sz="1200" dirty="0" smtClean="0">
+                <a:latin typeface="+mj-lt"/>
+              </a:rPr>
+              <a:t>Yann </a:t>
+            </a:r>
+            <a:r>
+              <a:rPr lang="en-US" altLang="zh-CN" sz="1200" dirty="0" err="1" smtClean="0">
+                <a:latin typeface="+mj-lt"/>
+              </a:rPr>
+              <a:t>LeCun</a:t>
+            </a:r>
+            <a:r>
+              <a:rPr lang="en-US" altLang="zh-CN" sz="1200" dirty="0" smtClean="0">
+                <a:latin typeface="+mj-lt"/>
+              </a:rPr>
+              <a:t>, </a:t>
+            </a:r>
+            <a:r>
+              <a:rPr lang="en-US" altLang="zh-CN" sz="1200" dirty="0" err="1" smtClean="0">
+                <a:latin typeface="+mj-lt"/>
+              </a:rPr>
+              <a:t>Yoshua</a:t>
+            </a:r>
+            <a:r>
+              <a:rPr lang="en-US" altLang="zh-CN" sz="1200" dirty="0" smtClean="0">
+                <a:latin typeface="+mj-lt"/>
+              </a:rPr>
+              <a:t> </a:t>
+            </a:r>
+            <a:r>
+              <a:rPr lang="en-US" altLang="zh-CN" sz="1200" dirty="0" err="1" smtClean="0">
+                <a:latin typeface="+mj-lt"/>
+              </a:rPr>
+              <a:t>Bengio</a:t>
+            </a:r>
+            <a:r>
+              <a:rPr lang="en-US" altLang="zh-CN" sz="1200" dirty="0">
+                <a:latin typeface="+mj-lt"/>
+              </a:rPr>
+              <a:t> </a:t>
+            </a:r>
+            <a:r>
+              <a:rPr lang="en-US" altLang="zh-CN" sz="1200" dirty="0" smtClean="0">
+                <a:latin typeface="+mj-lt"/>
+              </a:rPr>
+              <a:t>&amp; Geoffrey Hinton.  Nature, 2015</a:t>
+            </a:r>
+            <a:endParaRPr lang="zh-CN" altLang="en-US" sz="1200" dirty="0">
+              <a:latin typeface="+mj-lt"/>
+            </a:endParaRPr>
+          </a:p>
+        </p:txBody>
+      </p:sp>
     </p:spTree>
     <p:extLst>
       <p:ext uri="{BB962C8B-B14F-4D97-AF65-F5344CB8AC3E}">
@@ -6594,6 +6705,462 @@
   <p:clrMapOvr>
     <a:masterClrMapping/>
   </p:clrMapOvr>
+  <p:timing>
+    <p:tnLst>
+      <p:par>
+        <p:cTn id="1" dur="indefinite" restart="never" nodeType="tmRoot">
+          <p:childTnLst>
+            <p:seq concurrent="1" nextAc="seek">
+              <p:cTn id="2" dur="indefinite" nodeType="mainSeq">
+                <p:childTnLst>
+                  <p:par>
+                    <p:cTn id="3" fill="hold">
+                      <p:stCondLst>
+                        <p:cond delay="indefinite"/>
+                      </p:stCondLst>
+                      <p:childTnLst>
+                        <p:par>
+                          <p:cTn id="4" fill="hold">
+                            <p:stCondLst>
+                              <p:cond delay="0"/>
+                            </p:stCondLst>
+                            <p:childTnLst>
+                              <p:par>
+                                <p:cTn id="5" presetID="1" presetClass="entr" presetSubtype="0" fill="hold" grpId="0" nodeType="clickEffect">
+                                  <p:stCondLst>
+                                    <p:cond delay="0"/>
+                                  </p:stCondLst>
+                                  <p:childTnLst>
+                                    <p:set>
+                                      <p:cBhvr>
+                                        <p:cTn id="6" dur="1" fill="hold">
+                                          <p:stCondLst>
+                                            <p:cond delay="0"/>
+                                          </p:stCondLst>
+                                        </p:cTn>
+                                        <p:tgtEl>
+                                          <p:spTgt spid="3">
+                                            <p:txEl>
+                                              <p:pRg st="0" end="0"/>
+                                            </p:txEl>
+                                          </p:spTgt>
+                                        </p:tgtEl>
+                                        <p:attrNameLst>
+                                          <p:attrName>style.visibility</p:attrName>
+                                        </p:attrNameLst>
+                                      </p:cBhvr>
+                                      <p:to>
+                                        <p:strVal val="visible"/>
+                                      </p:to>
+                                    </p:set>
+                                  </p:childTnLst>
+                                </p:cTn>
+                              </p:par>
+                              <p:par>
+                                <p:cTn id="7" presetID="1" presetClass="entr" presetSubtype="0" fill="hold" grpId="0" nodeType="withEffect">
+                                  <p:stCondLst>
+                                    <p:cond delay="0"/>
+                                  </p:stCondLst>
+                                  <p:childTnLst>
+                                    <p:set>
+                                      <p:cBhvr>
+                                        <p:cTn id="8" dur="1" fill="hold">
+                                          <p:stCondLst>
+                                            <p:cond delay="0"/>
+                                          </p:stCondLst>
+                                        </p:cTn>
+                                        <p:tgtEl>
+                                          <p:spTgt spid="3">
+                                            <p:txEl>
+                                              <p:pRg st="1" end="1"/>
+                                            </p:txEl>
+                                          </p:spTgt>
+                                        </p:tgtEl>
+                                        <p:attrNameLst>
+                                          <p:attrName>style.visibility</p:attrName>
+                                        </p:attrNameLst>
+                                      </p:cBhvr>
+                                      <p:to>
+                                        <p:strVal val="visible"/>
+                                      </p:to>
+                                    </p:set>
+                                  </p:childTnLst>
+                                </p:cTn>
+                              </p:par>
+                              <p:par>
+                                <p:cTn id="9" presetID="1" presetClass="entr" presetSubtype="0" fill="hold" grpId="0" nodeType="withEffect">
+                                  <p:stCondLst>
+                                    <p:cond delay="0"/>
+                                  </p:stCondLst>
+                                  <p:childTnLst>
+                                    <p:set>
+                                      <p:cBhvr>
+                                        <p:cTn id="10" dur="1" fill="hold">
+                                          <p:stCondLst>
+                                            <p:cond delay="0"/>
+                                          </p:stCondLst>
+                                        </p:cTn>
+                                        <p:tgtEl>
+                                          <p:spTgt spid="3">
+                                            <p:txEl>
+                                              <p:pRg st="2" end="2"/>
+                                            </p:txEl>
+                                          </p:spTgt>
+                                        </p:tgtEl>
+                                        <p:attrNameLst>
+                                          <p:attrName>style.visibility</p:attrName>
+                                        </p:attrNameLst>
+                                      </p:cBhvr>
+                                      <p:to>
+                                        <p:strVal val="visible"/>
+                                      </p:to>
+                                    </p:set>
+                                  </p:childTnLst>
+                                </p:cTn>
+                              </p:par>
+                              <p:par>
+                                <p:cTn id="11" presetID="1" presetClass="entr" presetSubtype="0" fill="hold" grpId="0" nodeType="withEffect">
+                                  <p:stCondLst>
+                                    <p:cond delay="0"/>
+                                  </p:stCondLst>
+                                  <p:childTnLst>
+                                    <p:set>
+                                      <p:cBhvr>
+                                        <p:cTn id="12" dur="1" fill="hold">
+                                          <p:stCondLst>
+                                            <p:cond delay="0"/>
+                                          </p:stCondLst>
+                                        </p:cTn>
+                                        <p:tgtEl>
+                                          <p:spTgt spid="3">
+                                            <p:txEl>
+                                              <p:pRg st="3" end="3"/>
+                                            </p:txEl>
+                                          </p:spTgt>
+                                        </p:tgtEl>
+                                        <p:attrNameLst>
+                                          <p:attrName>style.visibility</p:attrName>
+                                        </p:attrNameLst>
+                                      </p:cBhvr>
+                                      <p:to>
+                                        <p:strVal val="visible"/>
+                                      </p:to>
+                                    </p:set>
+                                  </p:childTnLst>
+                                </p:cTn>
+                              </p:par>
+                            </p:childTnLst>
+                          </p:cTn>
+                        </p:par>
+                      </p:childTnLst>
+                    </p:cTn>
+                  </p:par>
+                  <p:par>
+                    <p:cTn id="13" fill="hold">
+                      <p:stCondLst>
+                        <p:cond delay="indefinite"/>
+                      </p:stCondLst>
+                      <p:childTnLst>
+                        <p:par>
+                          <p:cTn id="14" fill="hold">
+                            <p:stCondLst>
+                              <p:cond delay="0"/>
+                            </p:stCondLst>
+                            <p:childTnLst>
+                              <p:par>
+                                <p:cTn id="15" presetID="1" presetClass="entr" presetSubtype="0" fill="hold" grpId="0" nodeType="clickEffect">
+                                  <p:stCondLst>
+                                    <p:cond delay="0"/>
+                                  </p:stCondLst>
+                                  <p:childTnLst>
+                                    <p:set>
+                                      <p:cBhvr>
+                                        <p:cTn id="16" dur="1" fill="hold">
+                                          <p:stCondLst>
+                                            <p:cond delay="0"/>
+                                          </p:stCondLst>
+                                        </p:cTn>
+                                        <p:tgtEl>
+                                          <p:spTgt spid="3">
+                                            <p:txEl>
+                                              <p:pRg st="4" end="4"/>
+                                            </p:txEl>
+                                          </p:spTgt>
+                                        </p:tgtEl>
+                                        <p:attrNameLst>
+                                          <p:attrName>style.visibility</p:attrName>
+                                        </p:attrNameLst>
+                                      </p:cBhvr>
+                                      <p:to>
+                                        <p:strVal val="visible"/>
+                                      </p:to>
+                                    </p:set>
+                                  </p:childTnLst>
+                                </p:cTn>
+                              </p:par>
+                              <p:par>
+                                <p:cTn id="17" presetID="1" presetClass="entr" presetSubtype="0" fill="hold" grpId="0" nodeType="withEffect">
+                                  <p:stCondLst>
+                                    <p:cond delay="0"/>
+                                  </p:stCondLst>
+                                  <p:childTnLst>
+                                    <p:set>
+                                      <p:cBhvr>
+                                        <p:cTn id="18" dur="1" fill="hold">
+                                          <p:stCondLst>
+                                            <p:cond delay="0"/>
+                                          </p:stCondLst>
+                                        </p:cTn>
+                                        <p:tgtEl>
+                                          <p:spTgt spid="3">
+                                            <p:txEl>
+                                              <p:pRg st="5" end="5"/>
+                                            </p:txEl>
+                                          </p:spTgt>
+                                        </p:tgtEl>
+                                        <p:attrNameLst>
+                                          <p:attrName>style.visibility</p:attrName>
+                                        </p:attrNameLst>
+                                      </p:cBhvr>
+                                      <p:to>
+                                        <p:strVal val="visible"/>
+                                      </p:to>
+                                    </p:set>
+                                  </p:childTnLst>
+                                </p:cTn>
+                              </p:par>
+                              <p:par>
+                                <p:cTn id="19" presetID="1" presetClass="entr" presetSubtype="0" fill="hold" nodeType="withEffect">
+                                  <p:stCondLst>
+                                    <p:cond delay="0"/>
+                                  </p:stCondLst>
+                                  <p:childTnLst>
+                                    <p:set>
+                                      <p:cBhvr>
+                                        <p:cTn id="20" dur="1" fill="hold">
+                                          <p:stCondLst>
+                                            <p:cond delay="0"/>
+                                          </p:stCondLst>
+                                        </p:cTn>
+                                        <p:tgtEl>
+                                          <p:spTgt spid="7"/>
+                                        </p:tgtEl>
+                                        <p:attrNameLst>
+                                          <p:attrName>style.visibility</p:attrName>
+                                        </p:attrNameLst>
+                                      </p:cBhvr>
+                                      <p:to>
+                                        <p:strVal val="visible"/>
+                                      </p:to>
+                                    </p:set>
+                                  </p:childTnLst>
+                                </p:cTn>
+                              </p:par>
+                              <p:par>
+                                <p:cTn id="21" presetID="1" presetClass="entr" presetSubtype="0" fill="hold" grpId="0" nodeType="withEffect">
+                                  <p:stCondLst>
+                                    <p:cond delay="0"/>
+                                  </p:stCondLst>
+                                  <p:childTnLst>
+                                    <p:set>
+                                      <p:cBhvr>
+                                        <p:cTn id="22" dur="1" fill="hold">
+                                          <p:stCondLst>
+                                            <p:cond delay="0"/>
+                                          </p:stCondLst>
+                                        </p:cTn>
+                                        <p:tgtEl>
+                                          <p:spTgt spid="9"/>
+                                        </p:tgtEl>
+                                        <p:attrNameLst>
+                                          <p:attrName>style.visibility</p:attrName>
+                                        </p:attrNameLst>
+                                      </p:cBhvr>
+                                      <p:to>
+                                        <p:strVal val="visible"/>
+                                      </p:to>
+                                    </p:set>
+                                  </p:childTnLst>
+                                </p:cTn>
+                              </p:par>
+                            </p:childTnLst>
+                          </p:cTn>
+                        </p:par>
+                      </p:childTnLst>
+                    </p:cTn>
+                  </p:par>
+                </p:childTnLst>
+              </p:cTn>
+              <p:prevCondLst>
+                <p:cond evt="onPrev" delay="0">
+                  <p:tgtEl>
+                    <p:sldTgt/>
+                  </p:tgtEl>
+                </p:cond>
+              </p:prevCondLst>
+              <p:nextCondLst>
+                <p:cond evt="onNext" delay="0">
+                  <p:tgtEl>
+                    <p:sldTgt/>
+                  </p:tgtEl>
+                </p:cond>
+              </p:nextCondLst>
+            </p:seq>
+          </p:childTnLst>
+        </p:cTn>
+      </p:par>
+    </p:tnLst>
+    <p:bldLst>
+      <p:bldP spid="3" grpId="0" uiExpand="1" build="p"/>
+      <p:bldP spid="9" grpId="0"/>
+    </p:bldLst>
+  </p:timing>
+</p:sld>
+</file>
+
+<file path=ppt/slides/slide19.xml><?xml version="1.0" encoding="utf-8"?>
+<p:sld xmlns:a="http://schemas.openxmlformats.org/drawingml/2006/main" xmlns:r="http://schemas.openxmlformats.org/officeDocument/2006/relationships" xmlns:p="http://schemas.openxmlformats.org/presentationml/2006/main">
+  <p:cSld>
+    <p:spTree>
+      <p:nvGrpSpPr>
+        <p:cNvPr id="1" name=""/>
+        <p:cNvGrpSpPr/>
+        <p:nvPr/>
+      </p:nvGrpSpPr>
+      <p:grpSpPr>
+        <a:xfrm>
+          <a:off x="0" y="0"/>
+          <a:ext cx="0" cy="0"/>
+          <a:chOff x="0" y="0"/>
+          <a:chExt cx="0" cy="0"/>
+        </a:xfrm>
+      </p:grpSpPr>
+      <p:sp>
+        <p:nvSpPr>
+          <p:cNvPr id="2" name="标题 1"/>
+          <p:cNvSpPr>
+            <a:spLocks noGrp="1"/>
+          </p:cNvSpPr>
+          <p:nvPr>
+            <p:ph type="title"/>
+          </p:nvPr>
+        </p:nvSpPr>
+        <p:spPr>
+          <a:xfrm>
+            <a:off x="558000" y="2079759"/>
+            <a:ext cx="7886700" cy="1325563"/>
+          </a:xfrm>
+        </p:spPr>
+        <p:txBody>
+          <a:bodyPr/>
+          <a:lstStyle/>
+          <a:p>
+            <a:r>
+              <a:rPr lang="en-US" altLang="zh-CN" dirty="0" smtClean="0"/>
+              <a:t>Thanks for your listening !</a:t>
+            </a:r>
+            <a:endParaRPr lang="zh-CN" altLang="en-US" dirty="0"/>
+          </a:p>
+        </p:txBody>
+      </p:sp>
+      <p:sp>
+        <p:nvSpPr>
+          <p:cNvPr id="4" name="日期占位符 3"/>
+          <p:cNvSpPr>
+            <a:spLocks noGrp="1"/>
+          </p:cNvSpPr>
+          <p:nvPr>
+            <p:ph type="dt" sz="half" idx="10"/>
+          </p:nvPr>
+        </p:nvSpPr>
+        <p:spPr/>
+        <p:txBody>
+          <a:bodyPr/>
+          <a:lstStyle/>
+          <a:p>
+            <a:pPr>
+              <a:defRPr/>
+            </a:pPr>
+            <a:r>
+              <a:rPr lang="en-US" altLang="zh-CN" smtClean="0"/>
+              <a:t>Songpeng Zu</a:t>
+            </a:r>
+            <a:endParaRPr lang="zh-CN" altLang="en-US" dirty="0"/>
+          </a:p>
+        </p:txBody>
+      </p:sp>
+      <p:sp>
+        <p:nvSpPr>
+          <p:cNvPr id="5" name="页脚占位符 4"/>
+          <p:cNvSpPr>
+            <a:spLocks noGrp="1"/>
+          </p:cNvSpPr>
+          <p:nvPr>
+            <p:ph type="ftr" sz="quarter" idx="11"/>
+          </p:nvPr>
+        </p:nvSpPr>
+        <p:spPr/>
+        <p:txBody>
+          <a:bodyPr/>
+          <a:lstStyle/>
+          <a:p>
+            <a:pPr>
+              <a:defRPr/>
+            </a:pPr>
+            <a:r>
+              <a:rPr lang="en-US" altLang="zh-CN" smtClean="0"/>
+              <a:t>Machine Learning on Compound-Protein Interactions</a:t>
+            </a:r>
+            <a:endParaRPr lang="zh-CN" altLang="en-US" dirty="0"/>
+          </a:p>
+        </p:txBody>
+      </p:sp>
+      <p:sp>
+        <p:nvSpPr>
+          <p:cNvPr id="6" name="灯片编号占位符 5"/>
+          <p:cNvSpPr>
+            <a:spLocks noGrp="1"/>
+          </p:cNvSpPr>
+          <p:nvPr>
+            <p:ph type="sldNum" sz="quarter" idx="12"/>
+          </p:nvPr>
+        </p:nvSpPr>
+        <p:spPr/>
+        <p:txBody>
+          <a:bodyPr/>
+          <a:lstStyle/>
+          <a:p>
+            <a:pPr>
+              <a:defRPr/>
+            </a:pPr>
+            <a:fld id="{8636A3DD-18C9-47FF-B97C-D83E934F991A}" type="slidenum">
+              <a:rPr lang="zh-CN" altLang="en-US" smtClean="0"/>
+              <a:pPr>
+                <a:defRPr/>
+              </a:pPr>
+              <a:t>19</a:t>
+            </a:fld>
+            <a:endParaRPr lang="zh-CN" altLang="en-US" dirty="0"/>
+          </a:p>
+        </p:txBody>
+      </p:sp>
+    </p:spTree>
+    <p:extLst>
+      <p:ext uri="{BB962C8B-B14F-4D97-AF65-F5344CB8AC3E}">
+        <p14:creationId xmlns:p14="http://schemas.microsoft.com/office/powerpoint/2010/main" val="97088883"/>
+      </p:ext>
+    </p:extLst>
+  </p:cSld>
+  <p:clrMapOvr>
+    <a:masterClrMapping/>
+  </p:clrMapOvr>
+  <p:timing>
+    <p:tnLst>
+      <p:par>
+        <p:cTn id="1" dur="indefinite" restart="never" nodeType="tmRoot"/>
+      </p:par>
+    </p:tnLst>
+  </p:timing>
 </p:sld>
 </file>
 
@@ -7125,6 +7692,182 @@
           </a:prstGeom>
         </p:spPr>
       </p:pic>
+      <p:sp>
+        <p:nvSpPr>
+          <p:cNvPr id="11" name="文本框 7"/>
+          <p:cNvSpPr txBox="1"/>
+          <p:nvPr/>
+        </p:nvSpPr>
+        <p:spPr>
+          <a:xfrm>
+            <a:off x="4157318" y="6009484"/>
+            <a:ext cx="2246128" cy="276999"/>
+          </a:xfrm>
+          <a:prstGeom prst="rect">
+            <a:avLst/>
+          </a:prstGeom>
+          <a:noFill/>
+        </p:spPr>
+        <p:txBody>
+          <a:bodyPr wrap="none" rtlCol="0">
+            <a:spAutoFit/>
+          </a:bodyPr>
+          <a:lstStyle>
+            <a:defPPr>
+              <a:defRPr lang="zh-CN"/>
+            </a:defPPr>
+            <a:lvl1pPr algn="l" rtl="0" fontAlgn="base">
+              <a:spcBef>
+                <a:spcPct val="0"/>
+              </a:spcBef>
+              <a:spcAft>
+                <a:spcPct val="0"/>
+              </a:spcAft>
+              <a:defRPr kern="1200">
+                <a:solidFill>
+                  <a:schemeClr val="tx1"/>
+                </a:solidFill>
+                <a:latin typeface="Arial" charset="0"/>
+                <a:ea typeface="宋体" charset="-122"/>
+                <a:cs typeface="+mn-cs"/>
+              </a:defRPr>
+            </a:lvl1pPr>
+            <a:lvl2pPr marL="457200" algn="l" rtl="0" fontAlgn="base">
+              <a:spcBef>
+                <a:spcPct val="0"/>
+              </a:spcBef>
+              <a:spcAft>
+                <a:spcPct val="0"/>
+              </a:spcAft>
+              <a:defRPr kern="1200">
+                <a:solidFill>
+                  <a:schemeClr val="tx1"/>
+                </a:solidFill>
+                <a:latin typeface="Arial" charset="0"/>
+                <a:ea typeface="宋体" charset="-122"/>
+                <a:cs typeface="+mn-cs"/>
+              </a:defRPr>
+            </a:lvl2pPr>
+            <a:lvl3pPr marL="914400" algn="l" rtl="0" fontAlgn="base">
+              <a:spcBef>
+                <a:spcPct val="0"/>
+              </a:spcBef>
+              <a:spcAft>
+                <a:spcPct val="0"/>
+              </a:spcAft>
+              <a:defRPr kern="1200">
+                <a:solidFill>
+                  <a:schemeClr val="tx1"/>
+                </a:solidFill>
+                <a:latin typeface="Arial" charset="0"/>
+                <a:ea typeface="宋体" charset="-122"/>
+                <a:cs typeface="+mn-cs"/>
+              </a:defRPr>
+            </a:lvl3pPr>
+            <a:lvl4pPr marL="1371600" algn="l" rtl="0" fontAlgn="base">
+              <a:spcBef>
+                <a:spcPct val="0"/>
+              </a:spcBef>
+              <a:spcAft>
+                <a:spcPct val="0"/>
+              </a:spcAft>
+              <a:defRPr kern="1200">
+                <a:solidFill>
+                  <a:schemeClr val="tx1"/>
+                </a:solidFill>
+                <a:latin typeface="Arial" charset="0"/>
+                <a:ea typeface="宋体" charset="-122"/>
+                <a:cs typeface="+mn-cs"/>
+              </a:defRPr>
+            </a:lvl4pPr>
+            <a:lvl5pPr marL="1828800" algn="l" rtl="0" fontAlgn="base">
+              <a:spcBef>
+                <a:spcPct val="0"/>
+              </a:spcBef>
+              <a:spcAft>
+                <a:spcPct val="0"/>
+              </a:spcAft>
+              <a:defRPr kern="1200">
+                <a:solidFill>
+                  <a:schemeClr val="tx1"/>
+                </a:solidFill>
+                <a:latin typeface="Arial" charset="0"/>
+                <a:ea typeface="宋体" charset="-122"/>
+                <a:cs typeface="+mn-cs"/>
+              </a:defRPr>
+            </a:lvl5pPr>
+            <a:lvl6pPr marL="2286000" algn="l" defTabSz="914400" rtl="0" eaLnBrk="1" latinLnBrk="0" hangingPunct="1">
+              <a:defRPr kern="1200">
+                <a:solidFill>
+                  <a:schemeClr val="tx1"/>
+                </a:solidFill>
+                <a:latin typeface="Arial" charset="0"/>
+                <a:ea typeface="宋体" charset="-122"/>
+                <a:cs typeface="+mn-cs"/>
+              </a:defRPr>
+            </a:lvl6pPr>
+            <a:lvl7pPr marL="2743200" algn="l" defTabSz="914400" rtl="0" eaLnBrk="1" latinLnBrk="0" hangingPunct="1">
+              <a:defRPr kern="1200">
+                <a:solidFill>
+                  <a:schemeClr val="tx1"/>
+                </a:solidFill>
+                <a:latin typeface="Arial" charset="0"/>
+                <a:ea typeface="宋体" charset="-122"/>
+                <a:cs typeface="+mn-cs"/>
+              </a:defRPr>
+            </a:lvl7pPr>
+            <a:lvl8pPr marL="3200400" algn="l" defTabSz="914400" rtl="0" eaLnBrk="1" latinLnBrk="0" hangingPunct="1">
+              <a:defRPr kern="1200">
+                <a:solidFill>
+                  <a:schemeClr val="tx1"/>
+                </a:solidFill>
+                <a:latin typeface="Arial" charset="0"/>
+                <a:ea typeface="宋体" charset="-122"/>
+                <a:cs typeface="+mn-cs"/>
+              </a:defRPr>
+            </a:lvl8pPr>
+            <a:lvl9pPr marL="3657600" algn="l" defTabSz="914400" rtl="0" eaLnBrk="1" latinLnBrk="0" hangingPunct="1">
+              <a:defRPr kern="1200">
+                <a:solidFill>
+                  <a:schemeClr val="tx1"/>
+                </a:solidFill>
+                <a:latin typeface="Arial" charset="0"/>
+                <a:ea typeface="宋体" charset="-122"/>
+                <a:cs typeface="+mn-cs"/>
+              </a:defRPr>
+            </a:lvl9pPr>
+          </a:lstStyle>
+          <a:p>
+            <a:r>
+              <a:rPr lang="en-US" altLang="zh-CN" sz="1200" dirty="0" smtClean="0">
+                <a:latin typeface="+mj-lt"/>
+              </a:rPr>
+              <a:t>Zu, S. et al</a:t>
+            </a:r>
+            <a:r>
+              <a:rPr lang="en-US" altLang="zh-CN" sz="1200" dirty="0" smtClean="0">
+                <a:latin typeface="+mj-lt"/>
+              </a:rPr>
+              <a:t>., Bioinformatics</a:t>
+            </a:r>
+            <a:r>
+              <a:rPr lang="en-US" altLang="zh-CN" sz="1200" dirty="0" smtClean="0">
+                <a:latin typeface="+mj-lt"/>
+              </a:rPr>
+              <a:t>,</a:t>
+            </a:r>
+            <a:r>
+              <a:rPr lang="en-US" altLang="zh-CN" sz="1200" dirty="0" smtClean="0">
+                <a:latin typeface="+mj-lt"/>
+              </a:rPr>
+              <a:t>2015</a:t>
+            </a:r>
+            <a:endParaRPr lang="zh-CN" altLang="en-US" sz="1200" dirty="0">
+              <a:latin typeface="+mj-lt"/>
+            </a:endParaRPr>
+          </a:p>
+        </p:txBody>
+      </p:sp>
     </p:spTree>
     <p:extLst>
       <p:ext uri="{BB962C8B-B14F-4D97-AF65-F5344CB8AC3E}">

</xml_diff>